<commit_message>
commit fix shake + number picker a la con
</commit_message>
<xml_diff>
--- a/Docs/VoiceBox_final_presentation.pptx
+++ b/Docs/VoiceBox_final_presentation.pptx
@@ -4043,7 +4043,15 @@
           <a:p>
             <a:r>
               <a:rPr lang="fr-FR" sz="2000" dirty="0" smtClean="0"/>
-              <a:t>MAITRE Robin, VAILLANT YANN, XIAO KAI, FENG </a:t>
+              <a:t>MAITRE Robin, VAILLANT </a:t>
+            </a:r>
+            <a:r>
+              <a:rPr lang="fr-FR" sz="2000" dirty="0" smtClean="0"/>
+              <a:t>Yann, </a:t>
+            </a:r>
+            <a:r>
+              <a:rPr lang="fr-FR" sz="2000" dirty="0" smtClean="0"/>
+              <a:t>XIAO KAI, FENG </a:t>
             </a:r>
             <a:r>
               <a:rPr lang="fr-FR" sz="2000" dirty="0" err="1" smtClean="0"/>
@@ -4082,11 +4090,11 @@
   <p:clrMapOvr>
     <a:masterClrMapping/>
   </p:clrMapOvr>
-  <mc:AlternateContent xmlns:mc="http://schemas.openxmlformats.org/markup-compatibility/2006">
-    <mc:Choice xmlns:p14="http://schemas.microsoft.com/office/powerpoint/2010/main" Requires="p14">
+  <mc:AlternateContent xmlns:mc="http://schemas.openxmlformats.org/markup-compatibility/2006" xmlns:p14="http://schemas.microsoft.com/office/powerpoint/2010/main">
+    <mc:Choice Requires="p14">
       <p:transition spd="slow" p14:dur="2000"/>
     </mc:Choice>
-    <mc:Fallback>
+    <mc:Fallback xmlns="">
       <p:transition spd="slow"/>
     </mc:Fallback>
   </mc:AlternateContent>
@@ -4183,7 +4191,7 @@
         <p:spPr>
           <a:xfrm>
             <a:off x="3429000" y="2057400"/>
-            <a:ext cx="5257800" cy="1200329"/>
+            <a:ext cx="5257800" cy="1231106"/>
           </a:xfrm>
           <a:prstGeom prst="rect">
             <a:avLst/>
@@ -4202,8 +4210,17 @@
             </a:pPr>
             <a:r>
               <a:rPr lang="en-US" dirty="0" smtClean="0"/>
-              <a:t>Record / Stop </a:t>
-            </a:r>
+              <a:t>Record / </a:t>
+            </a:r>
+            <a:r>
+              <a:rPr lang="en-US" dirty="0" smtClean="0"/>
+              <a:t>Stop </a:t>
+            </a:r>
+            <a:r>
+              <a:rPr lang="en-US" sz="2000" b="1" u="sng" dirty="0" smtClean="0"/>
+              <a:t>(it’s a service) </a:t>
+            </a:r>
+            <a:endParaRPr lang="en-US" sz="2000" b="1" u="sng" dirty="0" smtClean="0"/>
           </a:p>
           <a:p>
             <a:pPr marL="285750" indent="-285750">
@@ -4683,13 +4700,10 @@
               <a:t>Settings </a:t>
             </a:r>
             <a:r>
-              <a:rPr lang="en-US" sz="2400" dirty="0" err="1" smtClean="0"/>
-              <a:t>avaibles</a:t>
-            </a:r>
-            <a:r>
-              <a:rPr lang="en-US" sz="2400" dirty="0" smtClean="0"/>
-              <a:t> :</a:t>
-            </a:r>
+              <a:rPr lang="en-US" sz="2400" dirty="0"/>
+              <a:t>available:</a:t>
+            </a:r>
+            <a:endParaRPr lang="en-US" sz="2400" dirty="0" smtClean="0"/>
           </a:p>
           <a:p>
             <a:endParaRPr lang="en-US" sz="2400" dirty="0" smtClean="0"/>
@@ -4859,7 +4873,7 @@
         </p:blipFill>
         <p:spPr bwMode="auto">
           <a:xfrm>
-            <a:off x="228600" y="1524000"/>
+            <a:off x="304800" y="1524000"/>
             <a:ext cx="2436579" cy="4468812"/>
           </a:xfrm>
           <a:prstGeom prst="rect">
@@ -5006,7 +5020,7 @@
         </p:nvSpPr>
         <p:spPr>
           <a:xfrm>
-            <a:off x="855861" y="6129439"/>
+            <a:off x="932061" y="6129439"/>
             <a:ext cx="1182055" cy="369332"/>
           </a:xfrm>
           <a:prstGeom prst="rect">
@@ -5036,7 +5050,7 @@
         </p:nvSpPr>
         <p:spPr>
           <a:xfrm>
-            <a:off x="6590390" y="6129830"/>
+            <a:off x="6590390" y="6129439"/>
             <a:ext cx="1752600" cy="369332"/>
           </a:xfrm>
           <a:prstGeom prst="rect">
@@ -5135,7 +5149,7 @@
         </p:blipFill>
         <p:spPr bwMode="auto">
           <a:xfrm>
-            <a:off x="228600" y="1524000"/>
+            <a:off x="304800" y="1524000"/>
             <a:ext cx="2436579" cy="4468812"/>
           </a:xfrm>
           <a:prstGeom prst="rect">

</xml_diff>